<commit_message>
renames *UnitTest* to *ComponentTest*
</commit_message>
<xml_diff>
--- a/doc/diagrams/TestDriverComponent.pptx
+++ b/doc/diagrams/TestDriverComponent.pptx
@@ -362,7 +362,7 @@
     </p:spTree>
     <p:extLst>
       <p:ext uri="{BB962C8B-B14F-4D97-AF65-F5344CB8AC3E}">
-        <p14:creationId xmlns:p14="http://schemas.microsoft.com/office/powerpoint/2010/main" xmlns="" val="913918898"/>
+        <p14:creationId xmlns="" xmlns:p14="http://schemas.microsoft.com/office/powerpoint/2010/main" val="913918898"/>
       </p:ext>
     </p:extLst>
   </p:cSld>
@@ -537,7 +537,7 @@
     </p:spTree>
     <p:extLst>
       <p:ext uri="{BB962C8B-B14F-4D97-AF65-F5344CB8AC3E}">
-        <p14:creationId xmlns:p14="http://schemas.microsoft.com/office/powerpoint/2010/main" xmlns="" val="1998377649"/>
+        <p14:creationId xmlns="" xmlns:p14="http://schemas.microsoft.com/office/powerpoint/2010/main" val="1998377649"/>
       </p:ext>
     </p:extLst>
   </p:cSld>
@@ -4415,7 +4415,11 @@
             <a:pPr algn="ctr"/>
             <a:r>
               <a:rPr lang="en-US" sz="1600" b="1" dirty="0" smtClean="0"/>
-              <a:t>Ui Tests</a:t>
+              <a:t>Ui </a:t>
+            </a:r>
+            <a:r>
+              <a:rPr lang="en-US" sz="1600" b="1" dirty="0" smtClean="0"/>
+              <a:t>Tests</a:t>
             </a:r>
             <a:endParaRPr lang="en-SG" sz="1600" b="1" dirty="0"/>
           </a:p>
@@ -4429,7 +4433,7 @@
         </p:nvSpPr>
         <p:spPr>
           <a:xfrm rot="16200000">
-            <a:off x="1344604" y="2402727"/>
+            <a:off x="1178674" y="2402727"/>
             <a:ext cx="1204823" cy="361770"/>
           </a:xfrm>
           <a:prstGeom prst="rect">
@@ -4473,7 +4477,7 @@
         </p:nvSpPr>
         <p:spPr>
           <a:xfrm rot="16200000">
-            <a:off x="1388755" y="2433362"/>
+            <a:off x="1222825" y="2433362"/>
             <a:ext cx="1204823" cy="361770"/>
           </a:xfrm>
           <a:prstGeom prst="rect">
@@ -4517,8 +4521,8 @@
         </p:nvSpPr>
         <p:spPr>
           <a:xfrm rot="16200000">
-            <a:off x="1435406" y="2476091"/>
-            <a:ext cx="1204823" cy="361770"/>
+            <a:off x="1341224" y="2404341"/>
+            <a:ext cx="1204823" cy="505268"/>
           </a:xfrm>
           <a:prstGeom prst="rect">
             <a:avLst/>
@@ -4547,7 +4551,11 @@
             <a:pPr algn="ctr"/>
             <a:r>
               <a:rPr lang="en-US" sz="1600" b="1" dirty="0" smtClean="0"/>
-              <a:t>Unit Tests</a:t>
+              <a:t>Component </a:t>
+            </a:r>
+            <a:r>
+              <a:rPr lang="en-US" sz="1600" b="1" dirty="0" smtClean="0"/>
+              <a:t>Tests</a:t>
             </a:r>
             <a:endParaRPr lang="en-SG" sz="1600" b="1" dirty="0"/>
           </a:p>
@@ -4644,9 +4652,9 @@
           <p:nvPr/>
         </p:nvCxnSpPr>
         <p:spPr>
-          <a:xfrm rot="16200000" flipV="1">
-            <a:off x="1814708" y="1848894"/>
-            <a:ext cx="261425" cy="3190"/>
+          <a:xfrm rot="5400000" flipH="1" flipV="1">
+            <a:off x="1731743" y="1769119"/>
+            <a:ext cx="261425" cy="162740"/>
           </a:xfrm>
           <a:prstGeom prst="bentConnector3">
             <a:avLst>
@@ -4679,7 +4687,7 @@
         </p:nvSpPr>
         <p:spPr>
           <a:xfrm rot="16200000">
-            <a:off x="1197104" y="4339111"/>
+            <a:off x="1072975" y="4339111"/>
             <a:ext cx="1663621" cy="361770"/>
           </a:xfrm>
           <a:prstGeom prst="rect">
@@ -4809,9 +4817,9 @@
           <p:nvPr/>
         </p:nvCxnSpPr>
         <p:spPr>
-          <a:xfrm rot="5400000">
-            <a:off x="1880095" y="5382153"/>
-            <a:ext cx="179167" cy="118474"/>
+          <a:xfrm rot="16200000" flipH="1">
+            <a:off x="1818030" y="5438562"/>
+            <a:ext cx="179167" cy="5655"/>
           </a:xfrm>
           <a:prstGeom prst="bentConnector3">
             <a:avLst>
@@ -5612,7 +5620,7 @@
         </p:nvSpPr>
         <p:spPr>
           <a:xfrm>
-            <a:off x="1977796" y="3541675"/>
+            <a:off x="1853667" y="3541675"/>
             <a:ext cx="141518" cy="127830"/>
           </a:xfrm>
           <a:prstGeom prst="flowChartDecision">
@@ -5654,7 +5662,7 @@
         </p:nvCxnSpPr>
         <p:spPr>
           <a:xfrm rot="5400000">
-            <a:off x="1908423" y="3401538"/>
+            <a:off x="1784294" y="3401538"/>
             <a:ext cx="280270" cy="5"/>
           </a:xfrm>
           <a:prstGeom prst="bentConnector3">
@@ -6204,10 +6212,171 @@
           </a:fontRef>
         </p:style>
       </p:cxnSp>
+      <p:sp>
+        <p:nvSpPr>
+          <p:cNvPr id="58" name="TextBox 57"/>
+          <p:cNvSpPr txBox="1"/>
+          <p:nvPr/>
+        </p:nvSpPr>
+        <p:spPr>
+          <a:xfrm>
+            <a:off x="838200" y="6550223"/>
+            <a:ext cx="1319257" cy="307777"/>
+          </a:xfrm>
+          <a:prstGeom prst="rect">
+            <a:avLst/>
+          </a:prstGeom>
+          <a:grpFill/>
+          <a:ln>
+            <a:noFill/>
+          </a:ln>
+        </p:spPr>
+        <p:style>
+          <a:lnRef idx="2">
+            <a:schemeClr val="accent1">
+              <a:shade val="50000"/>
+            </a:schemeClr>
+          </a:lnRef>
+          <a:fillRef idx="1">
+            <a:schemeClr val="accent1"/>
+          </a:fillRef>
+          <a:effectRef idx="0">
+            <a:schemeClr val="accent1"/>
+          </a:effectRef>
+          <a:fontRef idx="minor">
+            <a:schemeClr val="lt1"/>
+          </a:fontRef>
+        </p:style>
+        <p:txBody>
+          <a:bodyPr rtlCol="0" anchor="t" anchorCtr="0"/>
+          <a:lstStyle>
+            <a:defPPr>
+              <a:defRPr lang="en-US"/>
+            </a:defPPr>
+            <a:lvl1pPr>
+              <a:defRPr sz="1400" b="1">
+                <a:solidFill>
+                  <a:srgbClr val="7030A0"/>
+                </a:solidFill>
+              </a:defRPr>
+            </a:lvl1pPr>
+            <a:lvl2pPr>
+              <a:defRPr>
+                <a:solidFill>
+                  <a:schemeClr val="lt1"/>
+                </a:solidFill>
+              </a:defRPr>
+            </a:lvl2pPr>
+            <a:lvl3pPr>
+              <a:defRPr>
+                <a:solidFill>
+                  <a:schemeClr val="lt1"/>
+                </a:solidFill>
+              </a:defRPr>
+            </a:lvl3pPr>
+            <a:lvl4pPr>
+              <a:defRPr>
+                <a:solidFill>
+                  <a:schemeClr val="lt1"/>
+                </a:solidFill>
+              </a:defRPr>
+            </a:lvl4pPr>
+            <a:lvl5pPr>
+              <a:defRPr>
+                <a:solidFill>
+                  <a:schemeClr val="lt1"/>
+                </a:solidFill>
+              </a:defRPr>
+            </a:lvl5pPr>
+            <a:lvl6pPr>
+              <a:defRPr>
+                <a:solidFill>
+                  <a:schemeClr val="lt1"/>
+                </a:solidFill>
+              </a:defRPr>
+            </a:lvl6pPr>
+            <a:lvl7pPr>
+              <a:defRPr>
+                <a:solidFill>
+                  <a:schemeClr val="lt1"/>
+                </a:solidFill>
+              </a:defRPr>
+            </a:lvl7pPr>
+            <a:lvl8pPr>
+              <a:defRPr>
+                <a:solidFill>
+                  <a:schemeClr val="lt1"/>
+                </a:solidFill>
+              </a:defRPr>
+            </a:lvl8pPr>
+            <a:lvl9pPr>
+              <a:defRPr>
+                <a:solidFill>
+                  <a:schemeClr val="lt1"/>
+                </a:solidFill>
+              </a:defRPr>
+            </a:lvl9pPr>
+          </a:lstStyle>
+          <a:p>
+            <a:pPr algn="ctr"/>
+            <a:r>
+              <a:rPr lang="en-US" dirty="0" err="1" smtClean="0">
+                <a:solidFill>
+                  <a:schemeClr val="tx1"/>
+                </a:solidFill>
+              </a:rPr>
+              <a:t>JUnit</a:t>
+            </a:r>
+            <a:endParaRPr lang="en-SG" dirty="0">
+              <a:solidFill>
+                <a:schemeClr val="tx1"/>
+              </a:solidFill>
+            </a:endParaRPr>
+          </a:p>
+        </p:txBody>
+      </p:sp>
+      <p:cxnSp>
+        <p:nvCxnSpPr>
+          <p:cNvPr id="59" name="Straight Arrow Connector 58"/>
+          <p:cNvCxnSpPr/>
+          <p:nvPr/>
+        </p:nvCxnSpPr>
+        <p:spPr>
+          <a:xfrm flipH="1">
+            <a:off x="1524000" y="6172200"/>
+            <a:ext cx="1" cy="457200"/>
+          </a:xfrm>
+          <a:prstGeom prst="straightConnector1">
+            <a:avLst/>
+          </a:prstGeom>
+          <a:ln w="38100">
+            <a:solidFill>
+              <a:schemeClr val="tx1"/>
+            </a:solidFill>
+            <a:prstDash val="sysDash"/>
+            <a:headEnd type="arrow" w="med" len="med"/>
+            <a:tailEnd type="none" w="med" len="med"/>
+          </a:ln>
+        </p:spPr>
+        <p:style>
+          <a:lnRef idx="1">
+            <a:schemeClr val="accent1"/>
+          </a:lnRef>
+          <a:fillRef idx="0">
+            <a:schemeClr val="accent1"/>
+          </a:fillRef>
+          <a:effectRef idx="0">
+            <a:schemeClr val="accent1"/>
+          </a:effectRef>
+          <a:fontRef idx="minor">
+            <a:schemeClr val="tx1"/>
+          </a:fontRef>
+        </p:style>
+      </p:cxnSp>
     </p:spTree>
     <p:extLst>
       <p:ext uri="{BB962C8B-B14F-4D97-AF65-F5344CB8AC3E}">
-        <p14:creationId xmlns:p14="http://schemas.microsoft.com/office/powerpoint/2010/main" xmlns="" val="2312643091"/>
+        <p14:creationId xmlns="" xmlns:p14="http://schemas.microsoft.com/office/powerpoint/2010/main" val="2312643091"/>
       </p:ext>
     </p:extLst>
   </p:cSld>

</xml_diff>

<commit_message>
fixed typos in TestDriverComponentDiagrm
</commit_message>
<xml_diff>
--- a/doc/diagrams/TestDriverComponent.pptx
+++ b/doc/diagrams/TestDriverComponent.pptx
@@ -193,7 +193,7 @@
             <a:fld id="{AF301891-4E62-472A-98E9-95DBD40531A4}" type="datetimeFigureOut">
               <a:rPr lang="en-SG" smtClean="0"/>
               <a:pPr/>
-              <a:t>8/7/2012</a:t>
+              <a:t>10/7/2012</a:t>
             </a:fld>
             <a:endParaRPr lang="en-SG"/>
           </a:p>
@@ -362,7 +362,7 @@
     </p:spTree>
     <p:extLst>
       <p:ext uri="{BB962C8B-B14F-4D97-AF65-F5344CB8AC3E}">
-        <p14:creationId xmlns="" xmlns:p14="http://schemas.microsoft.com/office/powerpoint/2010/main" val="913918898"/>
+        <p14:creationId xmlns:p14="http://schemas.microsoft.com/office/powerpoint/2010/main" val="913918898"/>
       </p:ext>
     </p:extLst>
   </p:cSld>
@@ -537,7 +537,7 @@
     </p:spTree>
     <p:extLst>
       <p:ext uri="{BB962C8B-B14F-4D97-AF65-F5344CB8AC3E}">
-        <p14:creationId xmlns="" xmlns:p14="http://schemas.microsoft.com/office/powerpoint/2010/main" val="1998377649"/>
+        <p14:creationId xmlns:p14="http://schemas.microsoft.com/office/powerpoint/2010/main" val="1998377649"/>
       </p:ext>
     </p:extLst>
   </p:cSld>
@@ -729,7 +729,7 @@
             <a:fld id="{1D8BD707-D9CF-40AE-B4C6-C98DA3205C09}" type="datetimeFigureOut">
               <a:rPr lang="en-US" smtClean="0"/>
               <a:pPr/>
-              <a:t>7/8/2012</a:t>
+              <a:t>7/10/2012</a:t>
             </a:fld>
             <a:endParaRPr lang="en-US"/>
           </a:p>
@@ -896,7 +896,7 @@
             <a:fld id="{1D8BD707-D9CF-40AE-B4C6-C98DA3205C09}" type="datetimeFigureOut">
               <a:rPr lang="en-US" smtClean="0"/>
               <a:pPr/>
-              <a:t>7/8/2012</a:t>
+              <a:t>7/10/2012</a:t>
             </a:fld>
             <a:endParaRPr lang="en-US"/>
           </a:p>
@@ -1073,7 +1073,7 @@
             <a:fld id="{1D8BD707-D9CF-40AE-B4C6-C98DA3205C09}" type="datetimeFigureOut">
               <a:rPr lang="en-US" smtClean="0"/>
               <a:pPr/>
-              <a:t>7/8/2012</a:t>
+              <a:t>7/10/2012</a:t>
             </a:fld>
             <a:endParaRPr lang="en-US"/>
           </a:p>
@@ -1240,7 +1240,7 @@
             <a:fld id="{1D8BD707-D9CF-40AE-B4C6-C98DA3205C09}" type="datetimeFigureOut">
               <a:rPr lang="en-US" smtClean="0"/>
               <a:pPr/>
-              <a:t>7/8/2012</a:t>
+              <a:t>7/10/2012</a:t>
             </a:fld>
             <a:endParaRPr lang="en-US"/>
           </a:p>
@@ -1483,7 +1483,7 @@
             <a:fld id="{1D8BD707-D9CF-40AE-B4C6-C98DA3205C09}" type="datetimeFigureOut">
               <a:rPr lang="en-US" smtClean="0"/>
               <a:pPr/>
-              <a:t>7/8/2012</a:t>
+              <a:t>7/10/2012</a:t>
             </a:fld>
             <a:endParaRPr lang="en-US"/>
           </a:p>
@@ -1768,7 +1768,7 @@
             <a:fld id="{1D8BD707-D9CF-40AE-B4C6-C98DA3205C09}" type="datetimeFigureOut">
               <a:rPr lang="en-US" smtClean="0"/>
               <a:pPr/>
-              <a:t>7/8/2012</a:t>
+              <a:t>7/10/2012</a:t>
             </a:fld>
             <a:endParaRPr lang="en-US"/>
           </a:p>
@@ -2187,7 +2187,7 @@
             <a:fld id="{1D8BD707-D9CF-40AE-B4C6-C98DA3205C09}" type="datetimeFigureOut">
               <a:rPr lang="en-US" smtClean="0"/>
               <a:pPr/>
-              <a:t>7/8/2012</a:t>
+              <a:t>7/10/2012</a:t>
             </a:fld>
             <a:endParaRPr lang="en-US"/>
           </a:p>
@@ -2302,7 +2302,7 @@
             <a:fld id="{1D8BD707-D9CF-40AE-B4C6-C98DA3205C09}" type="datetimeFigureOut">
               <a:rPr lang="en-US" smtClean="0"/>
               <a:pPr/>
-              <a:t>7/8/2012</a:t>
+              <a:t>7/10/2012</a:t>
             </a:fld>
             <a:endParaRPr lang="en-US"/>
           </a:p>
@@ -2394,7 +2394,7 @@
             <a:fld id="{1D8BD707-D9CF-40AE-B4C6-C98DA3205C09}" type="datetimeFigureOut">
               <a:rPr lang="en-US" smtClean="0"/>
               <a:pPr/>
-              <a:t>7/8/2012</a:t>
+              <a:t>7/10/2012</a:t>
             </a:fld>
             <a:endParaRPr lang="en-US"/>
           </a:p>
@@ -2668,7 +2668,7 @@
             <a:fld id="{1D8BD707-D9CF-40AE-B4C6-C98DA3205C09}" type="datetimeFigureOut">
               <a:rPr lang="en-US" smtClean="0"/>
               <a:pPr/>
-              <a:t>7/8/2012</a:t>
+              <a:t>7/10/2012</a:t>
             </a:fld>
             <a:endParaRPr lang="en-US"/>
           </a:p>
@@ -2918,7 +2918,7 @@
             <a:fld id="{1D8BD707-D9CF-40AE-B4C6-C98DA3205C09}" type="datetimeFigureOut">
               <a:rPr lang="en-US" smtClean="0"/>
               <a:pPr/>
-              <a:t>7/8/2012</a:t>
+              <a:t>7/10/2012</a:t>
             </a:fld>
             <a:endParaRPr lang="en-US"/>
           </a:p>
@@ -3128,7 +3128,7 @@
             <a:fld id="{1D8BD707-D9CF-40AE-B4C6-C98DA3205C09}" type="datetimeFigureOut">
               <a:rPr lang="en-US" smtClean="0"/>
               <a:pPr/>
-              <a:t>7/8/2012</a:t>
+              <a:t>7/10/2012</a:t>
             </a:fld>
             <a:endParaRPr lang="en-US"/>
           </a:p>
@@ -4120,7 +4120,7 @@
             <a:pPr algn="ctr"/>
             <a:r>
               <a:rPr lang="en-US" sz="1600" b="1" dirty="0" err="1" smtClean="0"/>
-              <a:t>AllCasesSuite</a:t>
+              <a:t>AllTestsSuite</a:t>
             </a:r>
             <a:endParaRPr lang="en-SG" sz="1600" b="1" dirty="0"/>
           </a:p>
@@ -4415,11 +4415,7 @@
             <a:pPr algn="ctr"/>
             <a:r>
               <a:rPr lang="en-US" sz="1600" b="1" dirty="0" smtClean="0"/>
-              <a:t>Ui </a:t>
-            </a:r>
-            <a:r>
-              <a:rPr lang="en-US" sz="1600" b="1" dirty="0" smtClean="0"/>
-              <a:t>Tests</a:t>
+              <a:t>Ui Tests</a:t>
             </a:r>
             <a:endParaRPr lang="en-SG" sz="1600" b="1" dirty="0"/>
           </a:p>
@@ -4551,11 +4547,7 @@
             <a:pPr algn="ctr"/>
             <a:r>
               <a:rPr lang="en-US" sz="1600" b="1" dirty="0" smtClean="0"/>
-              <a:t>Component </a:t>
-            </a:r>
-            <a:r>
-              <a:rPr lang="en-US" sz="1600" b="1" dirty="0" smtClean="0"/>
-              <a:t>Tests</a:t>
+              <a:t>Component Tests</a:t>
             </a:r>
             <a:endParaRPr lang="en-SG" sz="1600" b="1" dirty="0"/>
           </a:p>
@@ -4687,8 +4679,8 @@
         </p:nvSpPr>
         <p:spPr>
           <a:xfrm rot="16200000">
-            <a:off x="1072975" y="4339111"/>
-            <a:ext cx="1663621" cy="361770"/>
+            <a:off x="1011126" y="4277261"/>
+            <a:ext cx="1663621" cy="485469"/>
           </a:xfrm>
           <a:prstGeom prst="rect">
             <a:avLst/>
@@ -4717,7 +4709,18 @@
             <a:pPr algn="ctr"/>
             <a:r>
               <a:rPr lang="en-US" sz="1600" b="1" dirty="0" err="1" smtClean="0"/>
-              <a:t>AllUnitTestsSuite</a:t>
+              <a:t>AllComponet</a:t>
+            </a:r>
+            <a:r>
+              <a:rPr lang="en-US" sz="1600" b="1" dirty="0" smtClean="0"/>
+              <a:t/>
+            </a:r>
+            <a:br>
+              <a:rPr lang="en-US" sz="1600" b="1" dirty="0" smtClean="0"/>
+            </a:br>
+            <a:r>
+              <a:rPr lang="en-US" sz="1600" b="1" dirty="0" err="1" smtClean="0"/>
+              <a:t>TestsSuite</a:t>
             </a:r>
             <a:endParaRPr lang="en-SG" sz="1600" b="1" dirty="0"/>
           </a:p>
@@ -4818,8 +4821,8 @@
         </p:nvCxnSpPr>
         <p:spPr>
           <a:xfrm rot="16200000" flipH="1">
-            <a:off x="1818030" y="5438562"/>
-            <a:ext cx="179167" cy="5655"/>
+            <a:off x="1787105" y="5407638"/>
+            <a:ext cx="179168" cy="67504"/>
           </a:xfrm>
           <a:prstGeom prst="bentConnector3">
             <a:avLst>
@@ -6376,7 +6379,7 @@
     </p:spTree>
     <p:extLst>
       <p:ext uri="{BB962C8B-B14F-4D97-AF65-F5344CB8AC3E}">
-        <p14:creationId xmlns="" xmlns:p14="http://schemas.microsoft.com/office/powerpoint/2010/main" val="2312643091"/>
+        <p14:creationId xmlns:p14="http://schemas.microsoft.com/office/powerpoint/2010/main" val="2312643091"/>
       </p:ext>
     </p:extLst>
   </p:cSld>

</xml_diff>

<commit_message>
Issue 769: Migrate from JUnit to TestNG Update Issue 769 Did the basic migration. Some optimization still to be done, as a separate issue.
</commit_message>
<xml_diff>
--- a/doc/diagrams/TestDriverComponent.pptx
+++ b/doc/diagrams/TestDriverComponent.pptx
@@ -193,7 +193,7 @@
             <a:fld id="{AF301891-4E62-472A-98E9-95DBD40531A4}" type="datetimeFigureOut">
               <a:rPr lang="en-SG" smtClean="0"/>
               <a:pPr/>
-              <a:t>10/7/2012</a:t>
+              <a:t>28/4/2013</a:t>
             </a:fld>
             <a:endParaRPr lang="en-SG"/>
           </a:p>
@@ -729,7 +729,7 @@
             <a:fld id="{1D8BD707-D9CF-40AE-B4C6-C98DA3205C09}" type="datetimeFigureOut">
               <a:rPr lang="en-US" smtClean="0"/>
               <a:pPr/>
-              <a:t>7/10/2012</a:t>
+              <a:t>4/28/2013</a:t>
             </a:fld>
             <a:endParaRPr lang="en-US"/>
           </a:p>
@@ -896,7 +896,7 @@
             <a:fld id="{1D8BD707-D9CF-40AE-B4C6-C98DA3205C09}" type="datetimeFigureOut">
               <a:rPr lang="en-US" smtClean="0"/>
               <a:pPr/>
-              <a:t>7/10/2012</a:t>
+              <a:t>4/28/2013</a:t>
             </a:fld>
             <a:endParaRPr lang="en-US"/>
           </a:p>
@@ -1073,7 +1073,7 @@
             <a:fld id="{1D8BD707-D9CF-40AE-B4C6-C98DA3205C09}" type="datetimeFigureOut">
               <a:rPr lang="en-US" smtClean="0"/>
               <a:pPr/>
-              <a:t>7/10/2012</a:t>
+              <a:t>4/28/2013</a:t>
             </a:fld>
             <a:endParaRPr lang="en-US"/>
           </a:p>
@@ -1240,7 +1240,7 @@
             <a:fld id="{1D8BD707-D9CF-40AE-B4C6-C98DA3205C09}" type="datetimeFigureOut">
               <a:rPr lang="en-US" smtClean="0"/>
               <a:pPr/>
-              <a:t>7/10/2012</a:t>
+              <a:t>4/28/2013</a:t>
             </a:fld>
             <a:endParaRPr lang="en-US"/>
           </a:p>
@@ -1483,7 +1483,7 @@
             <a:fld id="{1D8BD707-D9CF-40AE-B4C6-C98DA3205C09}" type="datetimeFigureOut">
               <a:rPr lang="en-US" smtClean="0"/>
               <a:pPr/>
-              <a:t>7/10/2012</a:t>
+              <a:t>4/28/2013</a:t>
             </a:fld>
             <a:endParaRPr lang="en-US"/>
           </a:p>
@@ -1768,7 +1768,7 @@
             <a:fld id="{1D8BD707-D9CF-40AE-B4C6-C98DA3205C09}" type="datetimeFigureOut">
               <a:rPr lang="en-US" smtClean="0"/>
               <a:pPr/>
-              <a:t>7/10/2012</a:t>
+              <a:t>4/28/2013</a:t>
             </a:fld>
             <a:endParaRPr lang="en-US"/>
           </a:p>
@@ -2187,7 +2187,7 @@
             <a:fld id="{1D8BD707-D9CF-40AE-B4C6-C98DA3205C09}" type="datetimeFigureOut">
               <a:rPr lang="en-US" smtClean="0"/>
               <a:pPr/>
-              <a:t>7/10/2012</a:t>
+              <a:t>4/28/2013</a:t>
             </a:fld>
             <a:endParaRPr lang="en-US"/>
           </a:p>
@@ -2302,7 +2302,7 @@
             <a:fld id="{1D8BD707-D9CF-40AE-B4C6-C98DA3205C09}" type="datetimeFigureOut">
               <a:rPr lang="en-US" smtClean="0"/>
               <a:pPr/>
-              <a:t>7/10/2012</a:t>
+              <a:t>4/28/2013</a:t>
             </a:fld>
             <a:endParaRPr lang="en-US"/>
           </a:p>
@@ -2394,7 +2394,7 @@
             <a:fld id="{1D8BD707-D9CF-40AE-B4C6-C98DA3205C09}" type="datetimeFigureOut">
               <a:rPr lang="en-US" smtClean="0"/>
               <a:pPr/>
-              <a:t>7/10/2012</a:t>
+              <a:t>4/28/2013</a:t>
             </a:fld>
             <a:endParaRPr lang="en-US"/>
           </a:p>
@@ -2668,7 +2668,7 @@
             <a:fld id="{1D8BD707-D9CF-40AE-B4C6-C98DA3205C09}" type="datetimeFigureOut">
               <a:rPr lang="en-US" smtClean="0"/>
               <a:pPr/>
-              <a:t>7/10/2012</a:t>
+              <a:t>4/28/2013</a:t>
             </a:fld>
             <a:endParaRPr lang="en-US"/>
           </a:p>
@@ -2918,7 +2918,7 @@
             <a:fld id="{1D8BD707-D9CF-40AE-B4C6-C98DA3205C09}" type="datetimeFigureOut">
               <a:rPr lang="en-US" smtClean="0"/>
               <a:pPr/>
-              <a:t>7/10/2012</a:t>
+              <a:t>4/28/2013</a:t>
             </a:fld>
             <a:endParaRPr lang="en-US"/>
           </a:p>
@@ -3128,7 +3128,7 @@
             <a:fld id="{1D8BD707-D9CF-40AE-B4C6-C98DA3205C09}" type="datetimeFigureOut">
               <a:rPr lang="en-US" smtClean="0"/>
               <a:pPr/>
-              <a:t>7/10/2012</a:t>
+              <a:t>4/28/2013</a:t>
             </a:fld>
             <a:endParaRPr lang="en-US"/>
           </a:p>
@@ -4090,7 +4090,7 @@
         </p:nvSpPr>
         <p:spPr>
           <a:xfrm>
-            <a:off x="1222761" y="5657380"/>
+            <a:off x="1261950" y="5657380"/>
             <a:ext cx="1368039" cy="361770"/>
           </a:xfrm>
           <a:prstGeom prst="rect">
@@ -4119,8 +4119,8 @@
           <a:p>
             <a:pPr algn="ctr"/>
             <a:r>
-              <a:rPr lang="en-US" sz="1600" b="1" dirty="0" err="1" smtClean="0"/>
-              <a:t>AllTestsSuite</a:t>
+              <a:rPr lang="en-US" sz="1600" b="1" dirty="0" smtClean="0"/>
+              <a:t>testing.xml</a:t>
             </a:r>
             <a:endParaRPr lang="en-SG" sz="1600" b="1" dirty="0"/>
           </a:p>
@@ -4220,7 +4220,7 @@
         </p:nvSpPr>
         <p:spPr>
           <a:xfrm rot="16200000">
-            <a:off x="1907202" y="2402727"/>
+            <a:off x="1907202" y="3154702"/>
             <a:ext cx="1204823" cy="361770"/>
           </a:xfrm>
           <a:prstGeom prst="rect">
@@ -4307,12 +4307,12 @@
         </p:nvCxnSpPr>
         <p:spPr>
           <a:xfrm rot="16200000" flipV="1">
-            <a:off x="2102765" y="1560836"/>
-            <a:ext cx="292060" cy="609940"/>
+            <a:off x="1726778" y="1936824"/>
+            <a:ext cx="1044035" cy="609940"/>
           </a:xfrm>
           <a:prstGeom prst="bentConnector3">
             <a:avLst>
-              <a:gd name="adj1" fmla="val 57827"/>
+              <a:gd name="adj1" fmla="val 50000"/>
             </a:avLst>
           </a:prstGeom>
         </p:spPr>
@@ -4341,7 +4341,7 @@
         </p:nvSpPr>
         <p:spPr>
           <a:xfrm rot="16200000">
-            <a:off x="1951353" y="2433362"/>
+            <a:off x="1951353" y="3185337"/>
             <a:ext cx="1204823" cy="361770"/>
           </a:xfrm>
           <a:prstGeom prst="rect">
@@ -4385,7 +4385,7 @@
         </p:nvSpPr>
         <p:spPr>
           <a:xfrm rot="16200000">
-            <a:off x="1998004" y="2476091"/>
+            <a:off x="1998004" y="3228066"/>
             <a:ext cx="1204823" cy="361770"/>
           </a:xfrm>
           <a:prstGeom prst="rect">
@@ -4429,7 +4429,7 @@
         </p:nvSpPr>
         <p:spPr>
           <a:xfrm rot="16200000">
-            <a:off x="1178674" y="2402727"/>
+            <a:off x="1178674" y="3154702"/>
             <a:ext cx="1204823" cy="361770"/>
           </a:xfrm>
           <a:prstGeom prst="rect">
@@ -4473,7 +4473,7 @@
         </p:nvSpPr>
         <p:spPr>
           <a:xfrm rot="16200000">
-            <a:off x="1222825" y="2433362"/>
+            <a:off x="1222825" y="3185337"/>
             <a:ext cx="1204823" cy="361770"/>
           </a:xfrm>
           <a:prstGeom prst="rect">
@@ -4517,7 +4517,7 @@
         </p:nvSpPr>
         <p:spPr>
           <a:xfrm rot="16200000">
-            <a:off x="1341224" y="2404341"/>
+            <a:off x="1341224" y="3156316"/>
             <a:ext cx="1204823" cy="505268"/>
           </a:xfrm>
           <a:prstGeom prst="rect">
@@ -4561,7 +4561,7 @@
         </p:nvSpPr>
         <p:spPr>
           <a:xfrm rot="16200000">
-            <a:off x="524829" y="2453027"/>
+            <a:off x="524829" y="3205002"/>
             <a:ext cx="1305424" cy="361770"/>
           </a:xfrm>
           <a:prstGeom prst="rect">
@@ -4608,8 +4608,8 @@
         </p:nvCxnSpPr>
         <p:spPr>
           <a:xfrm rot="5400000">
-            <a:off x="1429971" y="1467346"/>
-            <a:ext cx="261424" cy="766284"/>
+            <a:off x="1053984" y="1843333"/>
+            <a:ext cx="1013399" cy="766284"/>
           </a:xfrm>
           <a:prstGeom prst="bentConnector3">
             <a:avLst>
@@ -4645,325 +4645,14 @@
         </p:nvCxnSpPr>
         <p:spPr>
           <a:xfrm rot="5400000" flipH="1" flipV="1">
-            <a:off x="1731743" y="1769119"/>
-            <a:ext cx="261425" cy="162740"/>
+            <a:off x="1355755" y="2145106"/>
+            <a:ext cx="1013400" cy="162740"/>
           </a:xfrm>
           <a:prstGeom prst="bentConnector3">
             <a:avLst>
               <a:gd name="adj1" fmla="val 50000"/>
             </a:avLst>
           </a:prstGeom>
-        </p:spPr>
-        <p:style>
-          <a:lnRef idx="2">
-            <a:schemeClr val="accent6">
-              <a:shade val="50000"/>
-            </a:schemeClr>
-          </a:lnRef>
-          <a:fillRef idx="1">
-            <a:schemeClr val="accent6"/>
-          </a:fillRef>
-          <a:effectRef idx="0">
-            <a:schemeClr val="accent6"/>
-          </a:effectRef>
-          <a:fontRef idx="minor">
-            <a:schemeClr val="lt1"/>
-          </a:fontRef>
-        </p:style>
-      </p:cxnSp>
-      <p:sp>
-        <p:nvSpPr>
-          <p:cNvPr id="170" name="Rectangle 169"/>
-          <p:cNvSpPr/>
-          <p:nvPr/>
-        </p:nvSpPr>
-        <p:spPr>
-          <a:xfrm rot="16200000">
-            <a:off x="1011126" y="4277261"/>
-            <a:ext cx="1663621" cy="485469"/>
-          </a:xfrm>
-          <a:prstGeom prst="rect">
-            <a:avLst/>
-          </a:prstGeom>
-        </p:spPr>
-        <p:style>
-          <a:lnRef idx="2">
-            <a:schemeClr val="accent5">
-              <a:shade val="50000"/>
-            </a:schemeClr>
-          </a:lnRef>
-          <a:fillRef idx="1">
-            <a:schemeClr val="accent5"/>
-          </a:fillRef>
-          <a:effectRef idx="0">
-            <a:schemeClr val="accent5"/>
-          </a:effectRef>
-          <a:fontRef idx="minor">
-            <a:schemeClr val="lt1"/>
-          </a:fontRef>
-        </p:style>
-        <p:txBody>
-          <a:bodyPr rtlCol="0" anchor="ctr"/>
-          <a:lstStyle/>
-          <a:p>
-            <a:pPr algn="ctr"/>
-            <a:r>
-              <a:rPr lang="en-US" sz="1600" b="1" dirty="0" err="1" smtClean="0"/>
-              <a:t>AllComponet</a:t>
-            </a:r>
-            <a:r>
-              <a:rPr lang="en-US" sz="1600" b="1" dirty="0" smtClean="0"/>
-              <a:t/>
-            </a:r>
-            <a:br>
-              <a:rPr lang="en-US" sz="1600" b="1" dirty="0" smtClean="0"/>
-            </a:br>
-            <a:r>
-              <a:rPr lang="en-US" sz="1600" b="1" dirty="0" err="1" smtClean="0"/>
-              <a:t>TestsSuite</a:t>
-            </a:r>
-            <a:endParaRPr lang="en-SG" sz="1600" b="1" dirty="0"/>
-          </a:p>
-        </p:txBody>
-      </p:sp>
-      <p:sp>
-        <p:nvSpPr>
-          <p:cNvPr id="171" name="Rectangle 170"/>
-          <p:cNvSpPr/>
-          <p:nvPr/>
-        </p:nvSpPr>
-        <p:spPr>
-          <a:xfrm rot="16200000">
-            <a:off x="1721135" y="4329741"/>
-            <a:ext cx="1682360" cy="361770"/>
-          </a:xfrm>
-          <a:prstGeom prst="rect">
-            <a:avLst/>
-          </a:prstGeom>
-        </p:spPr>
-        <p:style>
-          <a:lnRef idx="2">
-            <a:schemeClr val="accent5">
-              <a:shade val="50000"/>
-            </a:schemeClr>
-          </a:lnRef>
-          <a:fillRef idx="1">
-            <a:schemeClr val="accent5"/>
-          </a:fillRef>
-          <a:effectRef idx="0">
-            <a:schemeClr val="accent5"/>
-          </a:effectRef>
-          <a:fontRef idx="minor">
-            <a:schemeClr val="lt1"/>
-          </a:fontRef>
-        </p:style>
-        <p:txBody>
-          <a:bodyPr rtlCol="0" anchor="ctr"/>
-          <a:lstStyle/>
-          <a:p>
-            <a:pPr algn="ctr"/>
-            <a:r>
-              <a:rPr lang="en-US" sz="1600" b="1" dirty="0" err="1" smtClean="0"/>
-              <a:t>AllUiTestsSuite</a:t>
-            </a:r>
-            <a:endParaRPr lang="en-SG" sz="1600" b="1" dirty="0"/>
-          </a:p>
-        </p:txBody>
-      </p:sp>
-      <p:sp>
-        <p:nvSpPr>
-          <p:cNvPr id="175" name="Flowchart: Decision 174"/>
-          <p:cNvSpPr/>
-          <p:nvPr/>
-        </p:nvSpPr>
-        <p:spPr>
-          <a:xfrm>
-            <a:off x="1839682" y="5530974"/>
-            <a:ext cx="141518" cy="127830"/>
-          </a:xfrm>
-          <a:prstGeom prst="flowChartDecision">
-            <a:avLst/>
-          </a:prstGeom>
-        </p:spPr>
-        <p:style>
-          <a:lnRef idx="2">
-            <a:schemeClr val="accent5">
-              <a:shade val="50000"/>
-            </a:schemeClr>
-          </a:lnRef>
-          <a:fillRef idx="1">
-            <a:schemeClr val="accent5"/>
-          </a:fillRef>
-          <a:effectRef idx="0">
-            <a:schemeClr val="accent5"/>
-          </a:effectRef>
-          <a:fontRef idx="minor">
-            <a:schemeClr val="lt1"/>
-          </a:fontRef>
-        </p:style>
-        <p:txBody>
-          <a:bodyPr rtlCol="0" anchor="ctr"/>
-          <a:lstStyle/>
-          <a:p>
-            <a:pPr algn="ctr"/>
-            <a:endParaRPr lang="en-SG"/>
-          </a:p>
-        </p:txBody>
-      </p:sp>
-      <p:cxnSp>
-        <p:nvCxnSpPr>
-          <p:cNvPr id="176" name="Elbow Connector 175"/>
-          <p:cNvCxnSpPr>
-            <a:stCxn id="170" idx="1"/>
-            <a:endCxn id="175" idx="0"/>
-          </p:cNvCxnSpPr>
-          <p:nvPr/>
-        </p:nvCxnSpPr>
-        <p:spPr>
-          <a:xfrm rot="16200000" flipH="1">
-            <a:off x="1787105" y="5407638"/>
-            <a:ext cx="179168" cy="67504"/>
-          </a:xfrm>
-          <a:prstGeom prst="bentConnector3">
-            <a:avLst>
-              <a:gd name="adj1" fmla="val 50000"/>
-            </a:avLst>
-          </a:prstGeom>
-          <a:ln>
-            <a:solidFill>
-              <a:schemeClr val="accent5">
-                <a:lumMod val="75000"/>
-              </a:schemeClr>
-            </a:solidFill>
-          </a:ln>
-        </p:spPr>
-        <p:style>
-          <a:lnRef idx="2">
-            <a:schemeClr val="accent6">
-              <a:shade val="50000"/>
-            </a:schemeClr>
-          </a:lnRef>
-          <a:fillRef idx="1">
-            <a:schemeClr val="accent6"/>
-          </a:fillRef>
-          <a:effectRef idx="0">
-            <a:schemeClr val="accent6"/>
-          </a:effectRef>
-          <a:fontRef idx="minor">
-            <a:schemeClr val="lt1"/>
-          </a:fontRef>
-        </p:style>
-      </p:cxnSp>
-      <p:cxnSp>
-        <p:nvCxnSpPr>
-          <p:cNvPr id="179" name="Elbow Connector 178"/>
-          <p:cNvCxnSpPr>
-            <a:stCxn id="171" idx="1"/>
-            <a:endCxn id="175" idx="0"/>
-          </p:cNvCxnSpPr>
-          <p:nvPr/>
-        </p:nvCxnSpPr>
-        <p:spPr>
-          <a:xfrm rot="5400000">
-            <a:off x="2146794" y="5115453"/>
-            <a:ext cx="179168" cy="651874"/>
-          </a:xfrm>
-          <a:prstGeom prst="bentConnector3">
-            <a:avLst>
-              <a:gd name="adj1" fmla="val 50000"/>
-            </a:avLst>
-          </a:prstGeom>
-          <a:ln>
-            <a:solidFill>
-              <a:schemeClr val="accent5">
-                <a:lumMod val="75000"/>
-              </a:schemeClr>
-            </a:solidFill>
-          </a:ln>
-        </p:spPr>
-        <p:style>
-          <a:lnRef idx="2">
-            <a:schemeClr val="accent6">
-              <a:shade val="50000"/>
-            </a:schemeClr>
-          </a:lnRef>
-          <a:fillRef idx="1">
-            <a:schemeClr val="accent6"/>
-          </a:fillRef>
-          <a:effectRef idx="0">
-            <a:schemeClr val="accent6"/>
-          </a:effectRef>
-          <a:fontRef idx="minor">
-            <a:schemeClr val="lt1"/>
-          </a:fontRef>
-        </p:style>
-      </p:cxnSp>
-      <p:sp>
-        <p:nvSpPr>
-          <p:cNvPr id="182" name="Flowchart: Decision 181"/>
-          <p:cNvSpPr/>
-          <p:nvPr/>
-        </p:nvSpPr>
-        <p:spPr>
-          <a:xfrm>
-            <a:off x="2529652" y="3539658"/>
-            <a:ext cx="141518" cy="127830"/>
-          </a:xfrm>
-          <a:prstGeom prst="flowChartDecision">
-            <a:avLst/>
-          </a:prstGeom>
-        </p:spPr>
-        <p:style>
-          <a:lnRef idx="2">
-            <a:schemeClr val="accent5">
-              <a:shade val="50000"/>
-            </a:schemeClr>
-          </a:lnRef>
-          <a:fillRef idx="1">
-            <a:schemeClr val="accent5"/>
-          </a:fillRef>
-          <a:effectRef idx="0">
-            <a:schemeClr val="accent5"/>
-          </a:effectRef>
-          <a:fontRef idx="minor">
-            <a:schemeClr val="lt1"/>
-          </a:fontRef>
-        </p:style>
-        <p:txBody>
-          <a:bodyPr rtlCol="0" anchor="ctr"/>
-          <a:lstStyle/>
-          <a:p>
-            <a:pPr algn="ctr"/>
-            <a:endParaRPr lang="en-SG"/>
-          </a:p>
-        </p:txBody>
-      </p:sp>
-      <p:cxnSp>
-        <p:nvCxnSpPr>
-          <p:cNvPr id="183" name="Elbow Connector 182"/>
-          <p:cNvCxnSpPr>
-            <a:stCxn id="145" idx="1"/>
-            <a:endCxn id="182" idx="0"/>
-          </p:cNvCxnSpPr>
-          <p:nvPr/>
-        </p:nvCxnSpPr>
-        <p:spPr>
-          <a:xfrm rot="5400000">
-            <a:off x="2460279" y="3399521"/>
-            <a:ext cx="280270" cy="5"/>
-          </a:xfrm>
-          <a:prstGeom prst="bentConnector3">
-            <a:avLst>
-              <a:gd name="adj1" fmla="val 50000"/>
-            </a:avLst>
-          </a:prstGeom>
-          <a:ln>
-            <a:solidFill>
-              <a:schemeClr val="accent5">
-                <a:lumMod val="75000"/>
-              </a:schemeClr>
-            </a:solidFill>
-          </a:ln>
         </p:spPr>
         <p:style>
           <a:lnRef idx="2">
@@ -4987,26 +4676,27 @@
           <p:cNvPr id="187" name="Elbow Connector 186"/>
           <p:cNvCxnSpPr>
             <a:stCxn id="150" idx="1"/>
-            <a:endCxn id="175" idx="0"/>
+            <a:endCxn id="103" idx="0"/>
           </p:cNvCxnSpPr>
           <p:nvPr/>
         </p:nvCxnSpPr>
         <p:spPr>
           <a:xfrm rot="16200000" flipH="1">
-            <a:off x="421816" y="4042349"/>
-            <a:ext cx="2244350" cy="732900"/>
+            <a:off x="752365" y="4463774"/>
+            <a:ext cx="1618781" cy="768429"/>
           </a:xfrm>
           <a:prstGeom prst="bentConnector3">
             <a:avLst>
-              <a:gd name="adj1" fmla="val 96175"/>
+              <a:gd name="adj1" fmla="val 50000"/>
             </a:avLst>
           </a:prstGeom>
           <a:ln>
             <a:solidFill>
-              <a:schemeClr val="accent5">
-                <a:lumMod val="75000"/>
-              </a:schemeClr>
+              <a:schemeClr val="accent1"/>
             </a:solidFill>
+            <a:prstDash val="sysDot"/>
+            <a:headEnd type="arrow" w="med" len="med"/>
+            <a:tailEnd type="none" w="med" len="med"/>
           </a:ln>
         </p:spPr>
         <p:style>
@@ -5500,8 +5190,8 @@
         </p:nvCxnSpPr>
         <p:spPr>
           <a:xfrm>
-            <a:off x="2781301" y="2656976"/>
-            <a:ext cx="1551210" cy="2864967"/>
+            <a:off x="2781301" y="3408951"/>
+            <a:ext cx="1551210" cy="2112992"/>
           </a:xfrm>
           <a:prstGeom prst="bentConnector3">
             <a:avLst>
@@ -5542,8 +5232,8 @@
         </p:nvCxnSpPr>
         <p:spPr>
           <a:xfrm>
-            <a:off x="2781301" y="2656976"/>
-            <a:ext cx="1551210" cy="2105524"/>
+            <a:off x="2781301" y="3408951"/>
+            <a:ext cx="1551210" cy="1353549"/>
           </a:xfrm>
           <a:prstGeom prst="bentConnector3">
             <a:avLst>
@@ -5583,9 +5273,9 @@
           <p:nvPr/>
         </p:nvCxnSpPr>
         <p:spPr>
-          <a:xfrm>
-            <a:off x="2781301" y="2656976"/>
-            <a:ext cx="1551210" cy="385328"/>
+          <a:xfrm flipV="1">
+            <a:off x="2781301" y="3042304"/>
+            <a:ext cx="1551210" cy="366647"/>
           </a:xfrm>
           <a:prstGeom prst="bentConnector3">
             <a:avLst>
@@ -5596,89 +5286,6 @@
             <a:prstDash val="sysDot"/>
             <a:headEnd type="none" w="med" len="med"/>
             <a:tailEnd type="arrow" w="med" len="med"/>
-          </a:ln>
-        </p:spPr>
-        <p:style>
-          <a:lnRef idx="2">
-            <a:schemeClr val="accent6">
-              <a:shade val="50000"/>
-            </a:schemeClr>
-          </a:lnRef>
-          <a:fillRef idx="1">
-            <a:schemeClr val="accent6"/>
-          </a:fillRef>
-          <a:effectRef idx="0">
-            <a:schemeClr val="accent6"/>
-          </a:effectRef>
-          <a:fontRef idx="minor">
-            <a:schemeClr val="lt1"/>
-          </a:fontRef>
-        </p:style>
-      </p:cxnSp>
-      <p:sp>
-        <p:nvSpPr>
-          <p:cNvPr id="280" name="Flowchart: Decision 279"/>
-          <p:cNvSpPr/>
-          <p:nvPr/>
-        </p:nvSpPr>
-        <p:spPr>
-          <a:xfrm>
-            <a:off x="1853667" y="3541675"/>
-            <a:ext cx="141518" cy="127830"/>
-          </a:xfrm>
-          <a:prstGeom prst="flowChartDecision">
-            <a:avLst/>
-          </a:prstGeom>
-        </p:spPr>
-        <p:style>
-          <a:lnRef idx="2">
-            <a:schemeClr val="accent5">
-              <a:shade val="50000"/>
-            </a:schemeClr>
-          </a:lnRef>
-          <a:fillRef idx="1">
-            <a:schemeClr val="accent5"/>
-          </a:fillRef>
-          <a:effectRef idx="0">
-            <a:schemeClr val="accent5"/>
-          </a:effectRef>
-          <a:fontRef idx="minor">
-            <a:schemeClr val="lt1"/>
-          </a:fontRef>
-        </p:style>
-        <p:txBody>
-          <a:bodyPr rtlCol="0" anchor="ctr"/>
-          <a:lstStyle/>
-          <a:p>
-            <a:pPr algn="ctr"/>
-            <a:endParaRPr lang="en-SG"/>
-          </a:p>
-        </p:txBody>
-      </p:sp>
-      <p:cxnSp>
-        <p:nvCxnSpPr>
-          <p:cNvPr id="281" name="Elbow Connector 280"/>
-          <p:cNvCxnSpPr>
-            <a:endCxn id="280" idx="0"/>
-          </p:cNvCxnSpPr>
-          <p:nvPr/>
-        </p:nvCxnSpPr>
-        <p:spPr>
-          <a:xfrm rot="5400000">
-            <a:off x="1784294" y="3401538"/>
-            <a:ext cx="280270" cy="5"/>
-          </a:xfrm>
-          <a:prstGeom prst="bentConnector3">
-            <a:avLst>
-              <a:gd name="adj1" fmla="val 50000"/>
-            </a:avLst>
-          </a:prstGeom>
-          <a:ln>
-            <a:solidFill>
-              <a:schemeClr val="accent5">
-                <a:lumMod val="75000"/>
-              </a:schemeClr>
-            </a:solidFill>
           </a:ln>
         </p:spPr>
         <p:style>
@@ -5928,7 +5535,7 @@
         <p:spPr>
           <a:xfrm flipV="1">
             <a:off x="2781301" y="1828069"/>
-            <a:ext cx="1551210" cy="828907"/>
+            <a:ext cx="1551210" cy="1580882"/>
           </a:xfrm>
           <a:prstGeom prst="bentConnector3">
             <a:avLst>
@@ -5969,8 +5576,8 @@
         </p:nvCxnSpPr>
         <p:spPr>
           <a:xfrm>
-            <a:off x="2781301" y="2656976"/>
-            <a:ext cx="1551210" cy="1153024"/>
+            <a:off x="2781301" y="3408951"/>
+            <a:ext cx="1551210" cy="401049"/>
           </a:xfrm>
           <a:prstGeom prst="bentConnector3">
             <a:avLst>
@@ -6328,7 +5935,7 @@
                   <a:schemeClr val="tx1"/>
                 </a:solidFill>
               </a:rPr>
-              <a:t>JUnit</a:t>
+              <a:t>TestNG</a:t>
             </a:r>
             <a:endParaRPr lang="en-SG" dirty="0">
               <a:solidFill>
@@ -6373,6 +5980,96 @@
           </a:effectRef>
           <a:fontRef idx="minor">
             <a:schemeClr val="tx1"/>
+          </a:fontRef>
+        </p:style>
+      </p:cxnSp>
+      <p:cxnSp>
+        <p:nvCxnSpPr>
+          <p:cNvPr id="62" name="Elbow Connector 61"/>
+          <p:cNvCxnSpPr>
+            <a:stCxn id="149" idx="1"/>
+            <a:endCxn id="103" idx="0"/>
+          </p:cNvCxnSpPr>
+          <p:nvPr/>
+        </p:nvCxnSpPr>
+        <p:spPr>
+          <a:xfrm rot="16200000" flipH="1">
+            <a:off x="1121794" y="4833204"/>
+            <a:ext cx="1646018" cy="2334"/>
+          </a:xfrm>
+          <a:prstGeom prst="bentConnector3">
+            <a:avLst>
+              <a:gd name="adj1" fmla="val 50000"/>
+            </a:avLst>
+          </a:prstGeom>
+          <a:ln>
+            <a:solidFill>
+              <a:schemeClr val="accent1"/>
+            </a:solidFill>
+            <a:prstDash val="sysDot"/>
+            <a:headEnd type="arrow" w="med" len="med"/>
+            <a:tailEnd type="none" w="med" len="med"/>
+          </a:ln>
+        </p:spPr>
+        <p:style>
+          <a:lnRef idx="2">
+            <a:schemeClr val="accent6">
+              <a:shade val="50000"/>
+            </a:schemeClr>
+          </a:lnRef>
+          <a:fillRef idx="1">
+            <a:schemeClr val="accent6"/>
+          </a:fillRef>
+          <a:effectRef idx="0">
+            <a:schemeClr val="accent6"/>
+          </a:effectRef>
+          <a:fontRef idx="minor">
+            <a:schemeClr val="lt1"/>
+          </a:fontRef>
+        </p:style>
+      </p:cxnSp>
+      <p:cxnSp>
+        <p:nvCxnSpPr>
+          <p:cNvPr id="64" name="Elbow Connector 63"/>
+          <p:cNvCxnSpPr>
+            <a:stCxn id="145" idx="1"/>
+            <a:endCxn id="103" idx="0"/>
+          </p:cNvCxnSpPr>
+          <p:nvPr/>
+        </p:nvCxnSpPr>
+        <p:spPr>
+          <a:xfrm rot="5400000">
+            <a:off x="1450185" y="4507148"/>
+            <a:ext cx="1646017" cy="654446"/>
+          </a:xfrm>
+          <a:prstGeom prst="bentConnector3">
+            <a:avLst>
+              <a:gd name="adj1" fmla="val 50000"/>
+            </a:avLst>
+          </a:prstGeom>
+          <a:ln>
+            <a:solidFill>
+              <a:schemeClr val="accent1"/>
+            </a:solidFill>
+            <a:prstDash val="sysDot"/>
+            <a:headEnd type="arrow" w="med" len="med"/>
+            <a:tailEnd type="none" w="med" len="med"/>
+          </a:ln>
+        </p:spPr>
+        <p:style>
+          <a:lnRef idx="2">
+            <a:schemeClr val="accent6">
+              <a:shade val="50000"/>
+            </a:schemeClr>
+          </a:lnRef>
+          <a:fillRef idx="1">
+            <a:schemeClr val="accent6"/>
+          </a:fillRef>
+          <a:effectRef idx="0">
+            <a:schemeClr val="accent6"/>
+          </a:effectRef>
+          <a:fontRef idx="minor">
+            <a:schemeClr val="lt1"/>
           </a:fontRef>
         </p:style>
       </p:cxnSp>

</xml_diff>

<commit_message>
Issue 992: DevMan: test.common package extends BaseTestCase, not BaseComponentTestCase Update Issue 992
</commit_message>
<xml_diff>
--- a/doc/diagrams/TestDriverComponent.pptx
+++ b/doc/diagrams/TestDriverComponent.pptx
@@ -193,7 +193,7 @@
             <a:fld id="{AF301891-4E62-472A-98E9-95DBD40531A4}" type="datetimeFigureOut">
               <a:rPr lang="en-SG" smtClean="0"/>
               <a:pPr/>
-              <a:t>6/7/2013</a:t>
+              <a:t>8/7/2013</a:t>
             </a:fld>
             <a:endParaRPr lang="en-SG"/>
           </a:p>
@@ -748,7 +748,7 @@
             <a:fld id="{1D8BD707-D9CF-40AE-B4C6-C98DA3205C09}" type="datetimeFigureOut">
               <a:rPr lang="en-US" smtClean="0"/>
               <a:pPr/>
-              <a:t>7/6/2013</a:t>
+              <a:t>7/8/2013</a:t>
             </a:fld>
             <a:endParaRPr lang="en-US"/>
           </a:p>
@@ -962,7 +962,7 @@
             <a:fld id="{1D8BD707-D9CF-40AE-B4C6-C98DA3205C09}" type="datetimeFigureOut">
               <a:rPr lang="en-US" smtClean="0"/>
               <a:pPr/>
-              <a:t>7/6/2013</a:t>
+              <a:t>7/8/2013</a:t>
             </a:fld>
             <a:endParaRPr lang="en-US"/>
           </a:p>
@@ -1169,7 +1169,7 @@
             <a:fld id="{1D8BD707-D9CF-40AE-B4C6-C98DA3205C09}" type="datetimeFigureOut">
               <a:rPr lang="en-US" smtClean="0"/>
               <a:pPr/>
-              <a:t>7/6/2013</a:t>
+              <a:t>7/8/2013</a:t>
             </a:fld>
             <a:endParaRPr lang="en-US"/>
           </a:p>
@@ -1376,7 +1376,7 @@
             <a:fld id="{1D8BD707-D9CF-40AE-B4C6-C98DA3205C09}" type="datetimeFigureOut">
               <a:rPr lang="en-US" smtClean="0"/>
               <a:pPr/>
-              <a:t>7/6/2013</a:t>
+              <a:t>7/8/2013</a:t>
             </a:fld>
             <a:endParaRPr lang="en-US"/>
           </a:p>
@@ -1649,7 +1649,7 @@
             <a:fld id="{1D8BD707-D9CF-40AE-B4C6-C98DA3205C09}" type="datetimeFigureOut">
               <a:rPr lang="en-US" smtClean="0"/>
               <a:pPr/>
-              <a:t>7/6/2013</a:t>
+              <a:t>7/8/2013</a:t>
             </a:fld>
             <a:endParaRPr lang="en-US"/>
           </a:p>
@@ -1972,7 +1972,7 @@
             <a:fld id="{1D8BD707-D9CF-40AE-B4C6-C98DA3205C09}" type="datetimeFigureOut">
               <a:rPr lang="en-US" smtClean="0"/>
               <a:pPr/>
-              <a:t>7/6/2013</a:t>
+              <a:t>7/8/2013</a:t>
             </a:fld>
             <a:endParaRPr lang="en-US"/>
           </a:p>
@@ -2435,7 +2435,7 @@
             <a:fld id="{1D8BD707-D9CF-40AE-B4C6-C98DA3205C09}" type="datetimeFigureOut">
               <a:rPr lang="en-US" smtClean="0"/>
               <a:pPr/>
-              <a:t>7/6/2013</a:t>
+              <a:t>7/8/2013</a:t>
             </a:fld>
             <a:endParaRPr lang="en-US"/>
           </a:p>
@@ -2582,7 +2582,7 @@
             <a:fld id="{1D8BD707-D9CF-40AE-B4C6-C98DA3205C09}" type="datetimeFigureOut">
               <a:rPr lang="en-US" smtClean="0"/>
               <a:pPr/>
-              <a:t>7/6/2013</a:t>
+              <a:t>7/8/2013</a:t>
             </a:fld>
             <a:endParaRPr lang="en-US"/>
           </a:p>
@@ -2698,7 +2698,7 @@
             <a:fld id="{1D8BD707-D9CF-40AE-B4C6-C98DA3205C09}" type="datetimeFigureOut">
               <a:rPr lang="en-US" smtClean="0"/>
               <a:pPr/>
-              <a:t>7/6/2013</a:t>
+              <a:t>7/8/2013</a:t>
             </a:fld>
             <a:endParaRPr lang="en-US"/>
           </a:p>
@@ -3005,7 +3005,7 @@
             <a:fld id="{1D8BD707-D9CF-40AE-B4C6-C98DA3205C09}" type="datetimeFigureOut">
               <a:rPr lang="en-US" smtClean="0"/>
               <a:pPr/>
-              <a:t>7/6/2013</a:t>
+              <a:t>7/8/2013</a:t>
             </a:fld>
             <a:endParaRPr lang="en-US"/>
           </a:p>
@@ -3288,7 +3288,7 @@
             <a:fld id="{1D8BD707-D9CF-40AE-B4C6-C98DA3205C09}" type="datetimeFigureOut">
               <a:rPr lang="en-US" smtClean="0"/>
               <a:pPr/>
-              <a:t>7/6/2013</a:t>
+              <a:t>7/8/2013</a:t>
             </a:fld>
             <a:endParaRPr lang="en-US"/>
           </a:p>
@@ -3512,17 +3512,7 @@
                     </a:schemeClr>
                   </a:solidFill>
                 </a:rPr>
-                <a:t>test</a:t>
-              </a:r>
-              <a:r>
-                <a:rPr lang="en-US" sz="1400" b="1" dirty="0" smtClean="0">
-                  <a:solidFill>
-                    <a:schemeClr val="accent2">
-                      <a:lumMod val="75000"/>
-                    </a:schemeClr>
-                  </a:solidFill>
-                </a:rPr>
-                <a:t>::</a:t>
+                <a:t>test::</a:t>
               </a:r>
               <a:r>
                 <a:rPr lang="en-US" sz="1400" b="1" dirty="0" err="1" smtClean="0">
@@ -4175,7 +4165,7 @@
         </p:nvGrpSpPr>
         <p:grpSpPr>
           <a:xfrm>
-            <a:off x="3190875" y="1032305"/>
+            <a:off x="3190875" y="803705"/>
             <a:ext cx="2362200" cy="872695"/>
             <a:chOff x="3190875" y="1032305"/>
             <a:chExt cx="2362200" cy="872695"/>
@@ -4319,7 +4309,7 @@
         </p:nvGrpSpPr>
         <p:grpSpPr>
           <a:xfrm>
-            <a:off x="3170009" y="2133600"/>
+            <a:off x="3170009" y="2731193"/>
             <a:ext cx="2362200" cy="1002607"/>
             <a:chOff x="3170009" y="2133600"/>
             <a:chExt cx="2362200" cy="1002607"/>
@@ -4467,7 +4457,7 @@
         </p:nvGrpSpPr>
         <p:grpSpPr>
           <a:xfrm>
-            <a:off x="3188277" y="3385269"/>
+            <a:off x="3199591" y="1793634"/>
             <a:ext cx="2362550" cy="872695"/>
             <a:chOff x="3188277" y="3385269"/>
             <a:chExt cx="2362550" cy="872695"/>
@@ -4611,7 +4601,7 @@
         </p:nvGrpSpPr>
         <p:grpSpPr>
           <a:xfrm>
-            <a:off x="3170009" y="4300344"/>
+            <a:off x="3170009" y="4156505"/>
             <a:ext cx="2362200" cy="872695"/>
             <a:chOff x="3170009" y="4300344"/>
             <a:chExt cx="2362200" cy="872695"/>
@@ -5255,7 +5245,7 @@
         </p:nvGrpSpPr>
         <p:grpSpPr>
           <a:xfrm rot="5400000">
-            <a:off x="4127145" y="1841513"/>
+            <a:off x="4127145" y="2439106"/>
             <a:ext cx="448042" cy="1946617"/>
             <a:chOff x="5145053" y="2923453"/>
             <a:chExt cx="452572" cy="1278187"/>
@@ -5405,8 +5395,8 @@
         </p:nvCxnSpPr>
         <p:spPr>
           <a:xfrm rot="16200000" flipH="1">
-            <a:off x="228555" y="2917874"/>
-            <a:ext cx="1714441" cy="108056"/>
+            <a:off x="-381045" y="3527474"/>
+            <a:ext cx="2933641" cy="108056"/>
           </a:xfrm>
           <a:prstGeom prst="bentConnector2">
             <a:avLst/>
@@ -5434,13 +5424,12 @@
           <p:cNvPr id="69" name="Elbow Connector 68"/>
           <p:cNvCxnSpPr>
             <a:stCxn id="121" idx="1"/>
-            <a:endCxn id="54" idx="3"/>
           </p:cNvCxnSpPr>
           <p:nvPr/>
         </p:nvCxnSpPr>
         <p:spPr>
           <a:xfrm rot="10800000">
-            <a:off x="1031748" y="2114682"/>
+            <a:off x="1031748" y="2715971"/>
             <a:ext cx="112963" cy="673566"/>
           </a:xfrm>
           <a:prstGeom prst="bentConnector2">
@@ -6053,19 +6042,17 @@
           <p:cNvPr id="89" name="Elbow Connector 88"/>
           <p:cNvCxnSpPr>
             <a:stCxn id="123" idx="0"/>
-            <a:endCxn id="47" idx="0"/>
+            <a:endCxn id="47" idx="1"/>
           </p:cNvCxnSpPr>
           <p:nvPr/>
         </p:nvCxnSpPr>
         <p:spPr>
-          <a:xfrm rot="16200000" flipH="1">
-            <a:off x="4591878" y="537332"/>
-            <a:ext cx="363063" cy="6222891"/>
-          </a:xfrm>
-          <a:prstGeom prst="bentConnector3">
-            <a:avLst>
-              <a:gd name="adj1" fmla="val -52788"/>
-            </a:avLst>
+          <a:xfrm rot="5400000" flipH="1" flipV="1">
+            <a:off x="3964620" y="1653655"/>
+            <a:ext cx="730137" cy="5335446"/>
+          </a:xfrm>
+          <a:prstGeom prst="bentConnector2">
+            <a:avLst/>
           </a:prstGeom>
           <a:ln>
             <a:solidFill>
@@ -6860,7 +6847,7 @@
         </p:nvSpPr>
         <p:spPr>
           <a:xfrm>
-            <a:off x="1144710" y="2520184"/>
+            <a:off x="1144710" y="3121473"/>
             <a:ext cx="1044324" cy="536127"/>
           </a:xfrm>
           <a:prstGeom prst="rect">
@@ -6915,7 +6902,7 @@
         </p:nvSpPr>
         <p:spPr>
           <a:xfrm>
-            <a:off x="1139803" y="3467246"/>
+            <a:off x="1139803" y="4686446"/>
             <a:ext cx="1044324" cy="723754"/>
           </a:xfrm>
           <a:prstGeom prst="rect">
@@ -6986,7 +6973,7 @@
         </p:nvSpPr>
         <p:spPr>
           <a:xfrm rot="16200000" flipH="1">
-            <a:off x="2165222" y="2711065"/>
+            <a:off x="2165222" y="3308658"/>
             <a:ext cx="276225" cy="228600"/>
           </a:xfrm>
           <a:prstGeom prst="triangle">
@@ -7028,7 +7015,7 @@
         </p:nvCxnSpPr>
         <p:spPr>
           <a:xfrm flipV="1">
-            <a:off x="2417635" y="2825365"/>
+            <a:off x="2417635" y="3422958"/>
             <a:ext cx="941359" cy="1"/>
           </a:xfrm>
           <a:prstGeom prst="line">
@@ -7060,7 +7047,7 @@
         </p:nvGrpSpPr>
         <p:grpSpPr>
           <a:xfrm rot="5400000">
-            <a:off x="4108673" y="631470"/>
+            <a:off x="4108673" y="402870"/>
             <a:ext cx="448041" cy="1946617"/>
             <a:chOff x="5145053" y="2923453"/>
             <a:chExt cx="452572" cy="1278187"/>
@@ -7207,7 +7194,7 @@
         </p:nvGrpSpPr>
         <p:grpSpPr>
           <a:xfrm rot="5400000">
-            <a:off x="4092563" y="2989274"/>
+            <a:off x="4103877" y="1397639"/>
             <a:ext cx="448042" cy="1946617"/>
             <a:chOff x="5145053" y="2923453"/>
             <a:chExt cx="452572" cy="1278187"/>
@@ -7233,33 +7220,25 @@
             <a:prstGeom prst="rect">
               <a:avLst/>
             </a:prstGeom>
-            <a:grpFill/>
-            <a:ln>
-              <a:solidFill>
-                <a:schemeClr val="accent2">
-                  <a:lumMod val="75000"/>
-                </a:schemeClr>
-              </a:solidFill>
-            </a:ln>
           </p:spPr>
           <p:style>
             <a:lnRef idx="2">
-              <a:schemeClr val="accent6">
+              <a:schemeClr val="accent3">
                 <a:shade val="50000"/>
               </a:schemeClr>
             </a:lnRef>
             <a:fillRef idx="1">
-              <a:schemeClr val="accent6"/>
+              <a:schemeClr val="accent3"/>
             </a:fillRef>
             <a:effectRef idx="0">
-              <a:schemeClr val="accent6"/>
+              <a:schemeClr val="accent3"/>
             </a:effectRef>
             <a:fontRef idx="minor">
               <a:schemeClr val="lt1"/>
             </a:fontRef>
           </p:style>
           <p:txBody>
-            <a:bodyPr lIns="0" rIns="0" rtlCol="0" anchor="ctr"/>
+            <a:bodyPr rtlCol="0" anchor="ctr"/>
             <a:lstStyle/>
             <a:p>
               <a:pPr algn="ctr"/>
@@ -7285,33 +7264,25 @@
             <a:prstGeom prst="rect">
               <a:avLst/>
             </a:prstGeom>
-            <a:grpFill/>
-            <a:ln>
-              <a:solidFill>
-                <a:schemeClr val="accent2">
-                  <a:lumMod val="75000"/>
-                </a:schemeClr>
-              </a:solidFill>
-            </a:ln>
           </p:spPr>
           <p:style>
             <a:lnRef idx="2">
-              <a:schemeClr val="accent6">
+              <a:schemeClr val="accent3">
                 <a:shade val="50000"/>
               </a:schemeClr>
             </a:lnRef>
             <a:fillRef idx="1">
-              <a:schemeClr val="accent6"/>
+              <a:schemeClr val="accent3"/>
             </a:fillRef>
             <a:effectRef idx="0">
-              <a:schemeClr val="accent6"/>
+              <a:schemeClr val="accent3"/>
             </a:effectRef>
             <a:fontRef idx="minor">
               <a:schemeClr val="lt1"/>
             </a:fontRef>
           </p:style>
           <p:txBody>
-            <a:bodyPr lIns="0" rIns="0" rtlCol="0" anchor="ctr"/>
+            <a:bodyPr rtlCol="0" anchor="ctr"/>
             <a:lstStyle/>
             <a:p>
               <a:pPr algn="ctr"/>
@@ -7337,38 +7308,30 @@
             <a:prstGeom prst="rect">
               <a:avLst/>
             </a:prstGeom>
-            <a:grpFill/>
-            <a:ln>
-              <a:solidFill>
-                <a:schemeClr val="accent2">
-                  <a:lumMod val="75000"/>
-                </a:schemeClr>
-              </a:solidFill>
-            </a:ln>
           </p:spPr>
           <p:style>
             <a:lnRef idx="2">
-              <a:schemeClr val="accent6">
+              <a:schemeClr val="accent3">
                 <a:shade val="50000"/>
               </a:schemeClr>
             </a:lnRef>
             <a:fillRef idx="1">
-              <a:schemeClr val="accent6"/>
+              <a:schemeClr val="accent3"/>
             </a:fillRef>
             <a:effectRef idx="0">
-              <a:schemeClr val="accent6"/>
+              <a:schemeClr val="accent3"/>
             </a:effectRef>
             <a:fontRef idx="minor">
               <a:schemeClr val="lt1"/>
             </a:fontRef>
           </p:style>
           <p:txBody>
-            <a:bodyPr lIns="0" rIns="0" rtlCol="0" anchor="ctr"/>
+            <a:bodyPr rtlCol="0" anchor="ctr"/>
             <a:lstStyle/>
             <a:p>
               <a:pPr algn="ctr"/>
               <a:r>
-                <a:rPr lang="en-US" sz="1600" b="1" dirty="0" smtClean="0"/>
+                <a:rPr lang="en-US" sz="1600" b="1" dirty="0"/>
                 <a:t>Common tests</a:t>
               </a:r>
               <a:endParaRPr lang="en-SG" sz="1600" b="1" dirty="0"/>
@@ -7384,7 +7347,7 @@
         </p:nvGrpSpPr>
         <p:grpSpPr>
           <a:xfrm rot="5400000">
-            <a:off x="4100982" y="3912832"/>
+            <a:off x="4100982" y="3768993"/>
             <a:ext cx="448040" cy="1946617"/>
             <a:chOff x="5145053" y="2923453"/>
             <a:chExt cx="452572" cy="1278187"/>
@@ -7738,7 +7701,7 @@
         </p:nvSpPr>
         <p:spPr>
           <a:xfrm rot="16200000" flipH="1">
-            <a:off x="2176462" y="3619904"/>
+            <a:off x="2176462" y="5005387"/>
             <a:ext cx="276225" cy="228600"/>
           </a:xfrm>
           <a:prstGeom prst="triangle">
@@ -7787,40 +7750,33 @@
         <p:nvCxnSpPr>
           <p:cNvPr id="158" name="Elbow Connector 157"/>
           <p:cNvCxnSpPr>
-            <a:stCxn id="157" idx="3"/>
+            <a:stCxn id="167" idx="3"/>
             <a:endCxn id="141" idx="1"/>
           </p:cNvCxnSpPr>
           <p:nvPr/>
         </p:nvCxnSpPr>
         <p:spPr>
           <a:xfrm>
-            <a:off x="2428875" y="3734205"/>
-            <a:ext cx="914400" cy="273324"/>
+            <a:off x="2036636" y="1626279"/>
+            <a:ext cx="1317953" cy="789615"/>
           </a:xfrm>
           <a:prstGeom prst="bentConnector3">
             <a:avLst>
               <a:gd name="adj1" fmla="val 50000"/>
             </a:avLst>
           </a:prstGeom>
-          <a:ln>
-            <a:solidFill>
-              <a:schemeClr val="accent2">
-                <a:lumMod val="75000"/>
-              </a:schemeClr>
-            </a:solidFill>
-          </a:ln>
         </p:spPr>
         <p:style>
           <a:lnRef idx="2">
-            <a:schemeClr val="accent6">
+            <a:schemeClr val="accent3">
               <a:shade val="50000"/>
             </a:schemeClr>
           </a:lnRef>
           <a:fillRef idx="1">
-            <a:schemeClr val="accent6"/>
+            <a:schemeClr val="accent3"/>
           </a:fillRef>
           <a:effectRef idx="0">
-            <a:schemeClr val="accent6"/>
+            <a:schemeClr val="accent3"/>
           </a:effectRef>
           <a:fontRef idx="minor">
             <a:schemeClr val="lt1"/>
@@ -7838,8 +7794,8 @@
         </p:nvCxnSpPr>
         <p:spPr>
           <a:xfrm>
-            <a:off x="2428875" y="3734205"/>
-            <a:ext cx="913551" cy="2111282"/>
+            <a:off x="2428875" y="5119688"/>
+            <a:ext cx="913551" cy="725799"/>
           </a:xfrm>
           <a:prstGeom prst="bentConnector3">
             <a:avLst>
@@ -7881,9 +7837,9 @@
           <p:nvPr/>
         </p:nvCxnSpPr>
         <p:spPr>
-          <a:xfrm>
-            <a:off x="2428875" y="3734205"/>
-            <a:ext cx="922818" cy="1196882"/>
+          <a:xfrm flipV="1">
+            <a:off x="2428875" y="4787248"/>
+            <a:ext cx="922818" cy="332440"/>
           </a:xfrm>
           <a:prstGeom prst="bentConnector3">
             <a:avLst>
@@ -7997,38 +7953,6 @@
       </p:sp>
       <p:cxnSp>
         <p:nvCxnSpPr>
-          <p:cNvPr id="168" name="Straight Connector 167"/>
-          <p:cNvCxnSpPr/>
-          <p:nvPr/>
-        </p:nvCxnSpPr>
-        <p:spPr>
-          <a:xfrm flipV="1">
-            <a:off x="2064836" y="1626279"/>
-            <a:ext cx="1278439" cy="1"/>
-          </a:xfrm>
-          <a:prstGeom prst="line">
-            <a:avLst/>
-          </a:prstGeom>
-        </p:spPr>
-        <p:style>
-          <a:lnRef idx="2">
-            <a:schemeClr val="accent3">
-              <a:shade val="50000"/>
-            </a:schemeClr>
-          </a:lnRef>
-          <a:fillRef idx="1">
-            <a:schemeClr val="accent3"/>
-          </a:fillRef>
-          <a:effectRef idx="0">
-            <a:schemeClr val="accent3"/>
-          </a:effectRef>
-          <a:fontRef idx="minor">
-            <a:schemeClr val="lt1"/>
-          </a:fontRef>
-        </p:style>
-      </p:cxnSp>
-      <p:cxnSp>
-        <p:nvCxnSpPr>
           <p:cNvPr id="209" name="Straight Arrow Connector 208"/>
           <p:cNvCxnSpPr>
             <a:stCxn id="107" idx="0"/>
@@ -8080,7 +8004,7 @@
         </p:nvCxnSpPr>
         <p:spPr>
           <a:xfrm>
-            <a:off x="5536538" y="2788248"/>
+            <a:off x="5536538" y="3048000"/>
             <a:ext cx="1311937" cy="0"/>
           </a:xfrm>
           <a:prstGeom prst="straightConnector1">
@@ -8108,6 +8032,43 @@
           </a:fillRef>
           <a:effectRef idx="0">
             <a:schemeClr val="accent6"/>
+          </a:effectRef>
+          <a:fontRef idx="minor">
+            <a:schemeClr val="lt1"/>
+          </a:fontRef>
+        </p:style>
+      </p:cxnSp>
+      <p:cxnSp>
+        <p:nvCxnSpPr>
+          <p:cNvPr id="94" name="Elbow Connector 93"/>
+          <p:cNvCxnSpPr>
+            <a:stCxn id="167" idx="3"/>
+            <a:endCxn id="137" idx="1"/>
+          </p:cNvCxnSpPr>
+          <p:nvPr/>
+        </p:nvCxnSpPr>
+        <p:spPr>
+          <a:xfrm flipV="1">
+            <a:off x="2036636" y="1421124"/>
+            <a:ext cx="1322748" cy="205155"/>
+          </a:xfrm>
+          <a:prstGeom prst="bentConnector3">
+            <a:avLst>
+              <a:gd name="adj1" fmla="val 50000"/>
+            </a:avLst>
+          </a:prstGeom>
+        </p:spPr>
+        <p:style>
+          <a:lnRef idx="2">
+            <a:schemeClr val="accent3">
+              <a:shade val="50000"/>
+            </a:schemeClr>
+          </a:lnRef>
+          <a:fillRef idx="1">
+            <a:schemeClr val="accent3"/>
+          </a:fillRef>
+          <a:effectRef idx="0">
+            <a:schemeClr val="accent3"/>
           </a:effectRef>
           <a:fontRef idx="minor">
             <a:schemeClr val="lt1"/>

</xml_diff>